<commit_message>
Remove elevation and other things
</commit_message>
<xml_diff>
--- a/inst/presentations/20220705_bes_macro_presentation.pptx
+++ b/inst/presentations/20220705_bes_macro_presentation.pptx
@@ -13621,24 +13621,6 @@
           </a:p>
         </p:txBody>
       </p:sp>
-      <p:sp>
-        <p:nvSpPr>
-          <p:cNvPr id="4" name="Picture Placeholder 3">
-            <a:extLst>
-              <a:ext uri="{FF2B5EF4-FFF2-40B4-BE49-F238E27FC236}">
-                <a16:creationId xmlns:a16="http://schemas.microsoft.com/office/drawing/2014/main" id="{160FFA3A-F0CC-48E6-9584-B9D84E4B6C3D}"/>
-              </a:ext>
-            </a:extLst>
-          </p:cNvPr>
-          <p:cNvSpPr>
-            <a:spLocks noGrp="1"/>
-          </p:cNvSpPr>
-          <p:nvPr>
-            <p:ph type="pic" sz="quarter" idx="23"/>
-          </p:nvPr>
-        </p:nvSpPr>
-        <p:spPr/>
-      </p:sp>
       <p:pic>
         <p:nvPicPr>
           <p:cNvPr id="5" name="Picture 4">
@@ -13661,8 +13643,38 @@
         </p:blipFill>
         <p:spPr>
           <a:xfrm>
-            <a:off x="627309" y="1536931"/>
-            <a:ext cx="5026872" cy="4549689"/>
+            <a:off x="627310" y="1536931"/>
+            <a:ext cx="4308086" cy="3899135"/>
+          </a:xfrm>
+          <a:prstGeom prst="rect">
+            <a:avLst/>
+          </a:prstGeom>
+        </p:spPr>
+      </p:pic>
+      <p:pic>
+        <p:nvPicPr>
+          <p:cNvPr id="6" name="Picture 5">
+            <a:extLst>
+              <a:ext uri="{FF2B5EF4-FFF2-40B4-BE49-F238E27FC236}">
+                <a16:creationId xmlns:a16="http://schemas.microsoft.com/office/drawing/2014/main" id="{4CC562F7-8B15-41BA-AAB1-A5BEC6D981B0}"/>
+              </a:ext>
+            </a:extLst>
+          </p:cNvPr>
+          <p:cNvPicPr>
+            <a:picLocks noChangeAspect="1"/>
+          </p:cNvPicPr>
+          <p:nvPr/>
+        </p:nvPicPr>
+        <p:blipFill>
+          <a:blip r:embed="rId3"/>
+          <a:stretch>
+            <a:fillRect/>
+          </a:stretch>
+        </p:blipFill>
+        <p:spPr>
+          <a:xfrm>
+            <a:off x="6392656" y="1536931"/>
+            <a:ext cx="4721040" cy="4021883"/>
           </a:xfrm>
           <a:prstGeom prst="rect">
             <a:avLst/>
@@ -13679,6 +13691,126 @@
   <p:clrMapOvr>
     <a:masterClrMapping/>
   </p:clrMapOvr>
+  <p:timing>
+    <p:tnLst>
+      <p:par>
+        <p:cTn id="1" dur="indefinite" restart="never" nodeType="tmRoot">
+          <p:childTnLst>
+            <p:seq concurrent="1" nextAc="seek">
+              <p:cTn id="2" dur="indefinite" nodeType="mainSeq">
+                <p:childTnLst>
+                  <p:par>
+                    <p:cTn id="3" fill="hold">
+                      <p:stCondLst>
+                        <p:cond delay="indefinite"/>
+                      </p:stCondLst>
+                      <p:childTnLst>
+                        <p:par>
+                          <p:cTn id="4" fill="hold">
+                            <p:stCondLst>
+                              <p:cond delay="0"/>
+                            </p:stCondLst>
+                            <p:childTnLst>
+                              <p:par>
+                                <p:cTn id="5" presetID="1" presetClass="entr" presetSubtype="0" fill="hold" nodeType="clickEffect">
+                                  <p:stCondLst>
+                                    <p:cond delay="0"/>
+                                  </p:stCondLst>
+                                  <p:childTnLst>
+                                    <p:set>
+                                      <p:cBhvr>
+                                        <p:cTn id="6" dur="1" fill="hold">
+                                          <p:stCondLst>
+                                            <p:cond delay="0"/>
+                                          </p:stCondLst>
+                                        </p:cTn>
+                                        <p:tgtEl>
+                                          <p:spTgt spid="5"/>
+                                        </p:tgtEl>
+                                        <p:attrNameLst>
+                                          <p:attrName>style.visibility</p:attrName>
+                                        </p:attrNameLst>
+                                      </p:cBhvr>
+                                      <p:to>
+                                        <p:strVal val="visible"/>
+                                      </p:to>
+                                    </p:set>
+                                  </p:childTnLst>
+                                </p:cTn>
+                              </p:par>
+                            </p:childTnLst>
+                          </p:cTn>
+                        </p:par>
+                      </p:childTnLst>
+                    </p:cTn>
+                  </p:par>
+                  <p:par>
+                    <p:cTn id="7" fill="hold">
+                      <p:stCondLst>
+                        <p:cond delay="indefinite"/>
+                      </p:stCondLst>
+                      <p:childTnLst>
+                        <p:par>
+                          <p:cTn id="8" fill="hold">
+                            <p:stCondLst>
+                              <p:cond delay="0"/>
+                            </p:stCondLst>
+                            <p:childTnLst>
+                              <p:par>
+                                <p:cTn id="9" presetID="1" presetClass="entr" presetSubtype="0" fill="hold" nodeType="clickEffect">
+                                  <p:stCondLst>
+                                    <p:cond delay="0"/>
+                                  </p:stCondLst>
+                                  <p:childTnLst>
+                                    <p:set>
+                                      <p:cBhvr>
+                                        <p:cTn id="10" dur="1" fill="hold">
+                                          <p:stCondLst>
+                                            <p:cond delay="0"/>
+                                          </p:stCondLst>
+                                        </p:cTn>
+                                        <p:tgtEl>
+                                          <p:spTgt spid="6"/>
+                                        </p:tgtEl>
+                                        <p:attrNameLst>
+                                          <p:attrName>style.visibility</p:attrName>
+                                        </p:attrNameLst>
+                                      </p:cBhvr>
+                                      <p:to>
+                                        <p:strVal val="visible"/>
+                                      </p:to>
+                                    </p:set>
+                                  </p:childTnLst>
+                                </p:cTn>
+                              </p:par>
+                            </p:childTnLst>
+                          </p:cTn>
+                        </p:par>
+                      </p:childTnLst>
+                    </p:cTn>
+                  </p:par>
+                </p:childTnLst>
+              </p:cTn>
+              <p:prevCondLst>
+                <p:cond evt="onPrev" delay="0">
+                  <p:tgtEl>
+                    <p:sldTgt/>
+                  </p:tgtEl>
+                </p:cond>
+              </p:prevCondLst>
+              <p:nextCondLst>
+                <p:cond evt="onNext" delay="0">
+                  <p:tgtEl>
+                    <p:sldTgt/>
+                  </p:tgtEl>
+                </p:cond>
+              </p:nextCondLst>
+            </p:seq>
+          </p:childTnLst>
+        </p:cTn>
+      </p:par>
+    </p:tnLst>
+  </p:timing>
 </p:sld>
 </file>
 
@@ -13701,24 +13833,6 @@
       </p:grpSpPr>
       <p:sp>
         <p:nvSpPr>
-          <p:cNvPr id="2" name="Picture Placeholder 1">
-            <a:extLst>
-              <a:ext uri="{FF2B5EF4-FFF2-40B4-BE49-F238E27FC236}">
-                <a16:creationId xmlns:a16="http://schemas.microsoft.com/office/drawing/2014/main" id="{882676C5-DF4A-4DE8-8C5D-4CA2E20F7C92}"/>
-              </a:ext>
-            </a:extLst>
-          </p:cNvPr>
-          <p:cNvSpPr>
-            <a:spLocks noGrp="1"/>
-          </p:cNvSpPr>
-          <p:nvPr>
-            <p:ph type="pic" sz="quarter" idx="21"/>
-          </p:nvPr>
-        </p:nvSpPr>
-        <p:spPr/>
-      </p:sp>
-      <p:sp>
-        <p:nvSpPr>
           <p:cNvPr id="3" name="Text Placeholder 2">
             <a:extLst>
               <a:ext uri="{FF2B5EF4-FFF2-40B4-BE49-F238E27FC236}">
@@ -13770,24 +13884,6 @@
             <a:endParaRPr lang="en-US" dirty="0"/>
           </a:p>
         </p:txBody>
-      </p:sp>
-      <p:sp>
-        <p:nvSpPr>
-          <p:cNvPr id="4" name="Picture Placeholder 3">
-            <a:extLst>
-              <a:ext uri="{FF2B5EF4-FFF2-40B4-BE49-F238E27FC236}">
-                <a16:creationId xmlns:a16="http://schemas.microsoft.com/office/drawing/2014/main" id="{160FFA3A-F0CC-48E6-9584-B9D84E4B6C3D}"/>
-              </a:ext>
-            </a:extLst>
-          </p:cNvPr>
-          <p:cNvSpPr>
-            <a:spLocks noGrp="1"/>
-          </p:cNvSpPr>
-          <p:nvPr>
-            <p:ph type="pic" sz="quarter" idx="23"/>
-          </p:nvPr>
-        </p:nvSpPr>
-        <p:spPr/>
       </p:sp>
     </p:spTree>
     <p:extLst>

</xml_diff>